<commit_message>
Updated Analysis: 16S_ASV_Analysis.R, DOC_Analysis.R, FCM_Analysis.R, Symbiodiniaceae_analysis.R. Added new figures: 16S_Stackedbar_Family_v1.jpg, ASV bubbleplot class v2 annotated.png, ASV bubbleplot class v2.png, DOC_percent_drawdown_per_treatment.jpeg, Microbialgrowth_after_24h_per_treatment.jpeg, Symbiont cells per cm2_Bleaching status at collection_v3.jpeg, Symbiont cells per cm2_Bleaching status at collection_v4.jpeg, Symbiont cells per cm2_per treatment v2.jpeg. Added new pptx workupof figures: ASV bubbleplot class v2 annotated.pptx, Symbiont cells per cm2_Bleaching status at collection_v4.pptx.
</commit_message>
<xml_diff>
--- a/figures/Symbiont cells per cm2_Bleaching status at collection_v4.pptx
+++ b/figures/Symbiont cells per cm2_Bleaching status at collection_v4.pptx
@@ -104,6 +104,11 @@
       </a:defRPr>
     </a:lvl9pPr>
   </p:defaultTextStyle>
+  <p:extLst>
+    <p:ext uri="{EFAFB233-063F-42B5-8137-9DF3F51BA10A}">
+      <p15:sldGuideLst xmlns:p15="http://schemas.microsoft.com/office/powerpoint/2012/main"/>
+    </p:ext>
+  </p:extLst>
 </p:presentation>
 </file>
 
@@ -238,7 +243,7 @@
           <a:p>
             <a:fld id="{680A9CCA-000A-46B9-84E3-95B39B3B07ED}" type="datetimeFigureOut">
               <a:rPr lang="en-US" smtClean="0"/>
-              <a:t>6/9/2022</a:t>
+              <a:t>6/10/2022</a:t>
             </a:fld>
             <a:endParaRPr lang="en-US"/>
           </a:p>
@@ -408,7 +413,7 @@
           <a:p>
             <a:fld id="{680A9CCA-000A-46B9-84E3-95B39B3B07ED}" type="datetimeFigureOut">
               <a:rPr lang="en-US" smtClean="0"/>
-              <a:t>6/9/2022</a:t>
+              <a:t>6/10/2022</a:t>
             </a:fld>
             <a:endParaRPr lang="en-US"/>
           </a:p>
@@ -588,7 +593,7 @@
           <a:p>
             <a:fld id="{680A9CCA-000A-46B9-84E3-95B39B3B07ED}" type="datetimeFigureOut">
               <a:rPr lang="en-US" smtClean="0"/>
-              <a:t>6/9/2022</a:t>
+              <a:t>6/10/2022</a:t>
             </a:fld>
             <a:endParaRPr lang="en-US"/>
           </a:p>
@@ -758,7 +763,7 @@
           <a:p>
             <a:fld id="{680A9CCA-000A-46B9-84E3-95B39B3B07ED}" type="datetimeFigureOut">
               <a:rPr lang="en-US" smtClean="0"/>
-              <a:t>6/9/2022</a:t>
+              <a:t>6/10/2022</a:t>
             </a:fld>
             <a:endParaRPr lang="en-US"/>
           </a:p>
@@ -1004,7 +1009,7 @@
           <a:p>
             <a:fld id="{680A9CCA-000A-46B9-84E3-95B39B3B07ED}" type="datetimeFigureOut">
               <a:rPr lang="en-US" smtClean="0"/>
-              <a:t>6/9/2022</a:t>
+              <a:t>6/10/2022</a:t>
             </a:fld>
             <a:endParaRPr lang="en-US"/>
           </a:p>
@@ -1236,7 +1241,7 @@
           <a:p>
             <a:fld id="{680A9CCA-000A-46B9-84E3-95B39B3B07ED}" type="datetimeFigureOut">
               <a:rPr lang="en-US" smtClean="0"/>
-              <a:t>6/9/2022</a:t>
+              <a:t>6/10/2022</a:t>
             </a:fld>
             <a:endParaRPr lang="en-US"/>
           </a:p>
@@ -1603,7 +1608,7 @@
           <a:p>
             <a:fld id="{680A9CCA-000A-46B9-84E3-95B39B3B07ED}" type="datetimeFigureOut">
               <a:rPr lang="en-US" smtClean="0"/>
-              <a:t>6/9/2022</a:t>
+              <a:t>6/10/2022</a:t>
             </a:fld>
             <a:endParaRPr lang="en-US"/>
           </a:p>
@@ -1721,7 +1726,7 @@
           <a:p>
             <a:fld id="{680A9CCA-000A-46B9-84E3-95B39B3B07ED}" type="datetimeFigureOut">
               <a:rPr lang="en-US" smtClean="0"/>
-              <a:t>6/9/2022</a:t>
+              <a:t>6/10/2022</a:t>
             </a:fld>
             <a:endParaRPr lang="en-US"/>
           </a:p>
@@ -1816,7 +1821,7 @@
           <a:p>
             <a:fld id="{680A9CCA-000A-46B9-84E3-95B39B3B07ED}" type="datetimeFigureOut">
               <a:rPr lang="en-US" smtClean="0"/>
-              <a:t>6/9/2022</a:t>
+              <a:t>6/10/2022</a:t>
             </a:fld>
             <a:endParaRPr lang="en-US"/>
           </a:p>
@@ -2093,7 +2098,7 @@
           <a:p>
             <a:fld id="{680A9CCA-000A-46B9-84E3-95B39B3B07ED}" type="datetimeFigureOut">
               <a:rPr lang="en-US" smtClean="0"/>
-              <a:t>6/9/2022</a:t>
+              <a:t>6/10/2022</a:t>
             </a:fld>
             <a:endParaRPr lang="en-US"/>
           </a:p>
@@ -2350,7 +2355,7 @@
           <a:p>
             <a:fld id="{680A9CCA-000A-46B9-84E3-95B39B3B07ED}" type="datetimeFigureOut">
               <a:rPr lang="en-US" smtClean="0"/>
-              <a:t>6/9/2022</a:t>
+              <a:t>6/10/2022</a:t>
             </a:fld>
             <a:endParaRPr lang="en-US"/>
           </a:p>
@@ -2563,7 +2568,7 @@
           <a:p>
             <a:fld id="{680A9CCA-000A-46B9-84E3-95B39B3B07ED}" type="datetimeFigureOut">
               <a:rPr lang="en-US" smtClean="0"/>
-              <a:t>6/9/2022</a:t>
+              <a:t>6/10/2022</a:t>
             </a:fld>
             <a:endParaRPr lang="en-US"/>
           </a:p>
@@ -2970,10 +2975,10 @@
       </p:grpSpPr>
       <p:pic>
         <p:nvPicPr>
-          <p:cNvPr id="12" name="Picture 11" descr="Chart, box and whisker chart&#10;&#10;Description automatically generated">
+          <p:cNvPr id="4" name="Picture 3" descr="Chart, box and whisker chart&#10;&#10;Description automatically generated">
             <a:extLst>
               <a:ext uri="{FF2B5EF4-FFF2-40B4-BE49-F238E27FC236}">
-                <a16:creationId xmlns:a16="http://schemas.microsoft.com/office/drawing/2014/main" id="{DD1C2561-408E-84CB-F200-355FAEAF6150}"/>
+                <a16:creationId xmlns:a16="http://schemas.microsoft.com/office/drawing/2014/main" id="{98E3FC7C-3D75-743C-1A9F-C47FDB217F08}"/>
               </a:ext>
             </a:extLst>
           </p:cNvPr>
@@ -3018,7 +3023,7 @@
         </p:nvSpPr>
         <p:spPr>
           <a:xfrm>
-            <a:off x="1216604" y="639332"/>
+            <a:off x="1582364" y="707912"/>
             <a:ext cx="970472" cy="451342"/>
           </a:xfrm>
           <a:prstGeom prst="rect">
@@ -3054,7 +3059,7 @@
         </p:nvSpPr>
         <p:spPr>
           <a:xfrm>
-            <a:off x="2381809" y="2419964"/>
+            <a:off x="2816149" y="2419964"/>
             <a:ext cx="970472" cy="451342"/>
           </a:xfrm>
           <a:prstGeom prst="rect">
@@ -3090,7 +3095,7 @@
         </p:nvSpPr>
         <p:spPr>
           <a:xfrm>
-            <a:off x="5076368" y="4114800"/>
+            <a:off x="5647868" y="4011930"/>
             <a:ext cx="970472" cy="451342"/>
           </a:xfrm>
           <a:prstGeom prst="rect">
@@ -3126,7 +3131,7 @@
         </p:nvSpPr>
         <p:spPr>
           <a:xfrm>
-            <a:off x="4045353" y="1968622"/>
+            <a:off x="4559703" y="1968622"/>
             <a:ext cx="1268081" cy="451342"/>
           </a:xfrm>
           <a:prstGeom prst="rect">
@@ -3161,7 +3166,7 @@
         </p:nvSpPr>
         <p:spPr>
           <a:xfrm>
-            <a:off x="8003997" y="3240488"/>
+            <a:off x="8312607" y="3214772"/>
             <a:ext cx="1268081" cy="451342"/>
           </a:xfrm>
           <a:prstGeom prst="rect">
@@ -3175,6 +3180,7 @@
           </a:bodyPr>
           <a:lstStyle/>
           <a:p>
+            <a:pPr algn="ctr"/>
             <a:r>
               <a:rPr lang="en-US" sz="2333" dirty="0"/>
               <a:t>C</a:t>
@@ -3196,7 +3202,7 @@
         </p:nvSpPr>
         <p:spPr>
           <a:xfrm>
-            <a:off x="6203441" y="2746202"/>
+            <a:off x="6923531" y="2734772"/>
             <a:ext cx="1604510" cy="451342"/>
           </a:xfrm>
           <a:prstGeom prst="rect">

</xml_diff>

<commit_message>
Updated 16S_ASV_Analysis.R, R/FCM_Analysis.R, R/Symbiodiniaceae_analysis.R, R/metabolite_ordination.R with new visualizations, mostly just updating treatment names. Also updated stats in FCM Analysis. Added associated new figures. Created a new (updated) figures pptx "Figures - Sparagon and Arts et al.  x_2023.pptx"
</commit_message>
<xml_diff>
--- a/figures/Symbiont cells per cm2_Bleaching status at collection_v4.pptx
+++ b/figures/Symbiont cells per cm2_Bleaching status at collection_v4.pptx
@@ -243,7 +243,7 @@
           <a:p>
             <a:fld id="{680A9CCA-000A-46B9-84E3-95B39B3B07ED}" type="datetimeFigureOut">
               <a:rPr lang="en-US" smtClean="0"/>
-              <a:t>6/10/2022</a:t>
+              <a:t>2/11/2023</a:t>
             </a:fld>
             <a:endParaRPr lang="en-US"/>
           </a:p>
@@ -413,7 +413,7 @@
           <a:p>
             <a:fld id="{680A9CCA-000A-46B9-84E3-95B39B3B07ED}" type="datetimeFigureOut">
               <a:rPr lang="en-US" smtClean="0"/>
-              <a:t>6/10/2022</a:t>
+              <a:t>2/11/2023</a:t>
             </a:fld>
             <a:endParaRPr lang="en-US"/>
           </a:p>
@@ -593,7 +593,7 @@
           <a:p>
             <a:fld id="{680A9CCA-000A-46B9-84E3-95B39B3B07ED}" type="datetimeFigureOut">
               <a:rPr lang="en-US" smtClean="0"/>
-              <a:t>6/10/2022</a:t>
+              <a:t>2/11/2023</a:t>
             </a:fld>
             <a:endParaRPr lang="en-US"/>
           </a:p>
@@ -763,7 +763,7 @@
           <a:p>
             <a:fld id="{680A9CCA-000A-46B9-84E3-95B39B3B07ED}" type="datetimeFigureOut">
               <a:rPr lang="en-US" smtClean="0"/>
-              <a:t>6/10/2022</a:t>
+              <a:t>2/11/2023</a:t>
             </a:fld>
             <a:endParaRPr lang="en-US"/>
           </a:p>
@@ -1009,7 +1009,7 @@
           <a:p>
             <a:fld id="{680A9CCA-000A-46B9-84E3-95B39B3B07ED}" type="datetimeFigureOut">
               <a:rPr lang="en-US" smtClean="0"/>
-              <a:t>6/10/2022</a:t>
+              <a:t>2/11/2023</a:t>
             </a:fld>
             <a:endParaRPr lang="en-US"/>
           </a:p>
@@ -1241,7 +1241,7 @@
           <a:p>
             <a:fld id="{680A9CCA-000A-46B9-84E3-95B39B3B07ED}" type="datetimeFigureOut">
               <a:rPr lang="en-US" smtClean="0"/>
-              <a:t>6/10/2022</a:t>
+              <a:t>2/11/2023</a:t>
             </a:fld>
             <a:endParaRPr lang="en-US"/>
           </a:p>
@@ -1608,7 +1608,7 @@
           <a:p>
             <a:fld id="{680A9CCA-000A-46B9-84E3-95B39B3B07ED}" type="datetimeFigureOut">
               <a:rPr lang="en-US" smtClean="0"/>
-              <a:t>6/10/2022</a:t>
+              <a:t>2/11/2023</a:t>
             </a:fld>
             <a:endParaRPr lang="en-US"/>
           </a:p>
@@ -1726,7 +1726,7 @@
           <a:p>
             <a:fld id="{680A9CCA-000A-46B9-84E3-95B39B3B07ED}" type="datetimeFigureOut">
               <a:rPr lang="en-US" smtClean="0"/>
-              <a:t>6/10/2022</a:t>
+              <a:t>2/11/2023</a:t>
             </a:fld>
             <a:endParaRPr lang="en-US"/>
           </a:p>
@@ -1821,7 +1821,7 @@
           <a:p>
             <a:fld id="{680A9CCA-000A-46B9-84E3-95B39B3B07ED}" type="datetimeFigureOut">
               <a:rPr lang="en-US" smtClean="0"/>
-              <a:t>6/10/2022</a:t>
+              <a:t>2/11/2023</a:t>
             </a:fld>
             <a:endParaRPr lang="en-US"/>
           </a:p>
@@ -2098,7 +2098,7 @@
           <a:p>
             <a:fld id="{680A9CCA-000A-46B9-84E3-95B39B3B07ED}" type="datetimeFigureOut">
               <a:rPr lang="en-US" smtClean="0"/>
-              <a:t>6/10/2022</a:t>
+              <a:t>2/11/2023</a:t>
             </a:fld>
             <a:endParaRPr lang="en-US"/>
           </a:p>
@@ -2355,7 +2355,7 @@
           <a:p>
             <a:fld id="{680A9CCA-000A-46B9-84E3-95B39B3B07ED}" type="datetimeFigureOut">
               <a:rPr lang="en-US" smtClean="0"/>
-              <a:t>6/10/2022</a:t>
+              <a:t>2/11/2023</a:t>
             </a:fld>
             <a:endParaRPr lang="en-US"/>
           </a:p>
@@ -2568,7 +2568,7 @@
           <a:p>
             <a:fld id="{680A9CCA-000A-46B9-84E3-95B39B3B07ED}" type="datetimeFigureOut">
               <a:rPr lang="en-US" smtClean="0"/>
-              <a:t>6/10/2022</a:t>
+              <a:t>2/11/2023</a:t>
             </a:fld>
             <a:endParaRPr lang="en-US"/>
           </a:p>
@@ -2975,10 +2975,10 @@
       </p:grpSpPr>
       <p:pic>
         <p:nvPicPr>
-          <p:cNvPr id="4" name="Picture 3" descr="Chart, box and whisker chart&#10;&#10;Description automatically generated">
+          <p:cNvPr id="3" name="Picture 2" descr="Chart, box and whisker chart&#10;&#10;Description automatically generated">
             <a:extLst>
               <a:ext uri="{FF2B5EF4-FFF2-40B4-BE49-F238E27FC236}">
-                <a16:creationId xmlns:a16="http://schemas.microsoft.com/office/drawing/2014/main" id="{98E3FC7C-3D75-743C-1A9F-C47FDB217F08}"/>
+                <a16:creationId xmlns:a16="http://schemas.microsoft.com/office/drawing/2014/main" id="{AEF122AF-A160-B05D-B67D-793F30DFC395}"/>
               </a:ext>
             </a:extLst>
           </p:cNvPr>

</xml_diff>